<commit_message>
Poprawiono link do źródła
</commit_message>
<xml_diff>
--- a/Gry Blockly/Blockly Animacja.pptx
+++ b/Gry Blockly/Blockly Animacja.pptx
@@ -4228,14 +4228,8 @@
               <a:rPr lang="pl-PL" dirty="0">
                 <a:hlinkClick r:id="rId2"/>
               </a:rPr>
-              <a:t>https://blockly-games.appspot.com/bird</a:t>
-            </a:r>
-            <a:endParaRPr lang="pl-PL" dirty="0"/>
-          </a:p>
-          <a:p>
-            <a:pPr marL="0" indent="0">
-              <a:buNone/>
-            </a:pPr>
+              <a:t>https://blockly-games.appspot.com/movie</a:t>
+            </a:r>
             <a:endParaRPr lang="pl-PL" dirty="0"/>
           </a:p>
         </p:txBody>

</xml_diff>